<commit_message>
renew tasks for c/w
</commit_message>
<xml_diff>
--- a/Python/1/tasks.pptx
+++ b/Python/1/tasks.pptx
@@ -7,6 +7,7 @@
   <p:sldIdLst>
     <p:sldId id="256" r:id="rId2"/>
     <p:sldId id="257" r:id="rId3"/>
+    <p:sldId id="258" r:id="rId4"/>
   </p:sldIdLst>
   <p:sldSz cx="12192000" cy="6858000"/>
   <p:notesSz cx="6858000" cy="9144000"/>
@@ -105,6 +106,11 @@
       </a:defRPr>
     </a:lvl9pPr>
   </p:defaultTextStyle>
+  <p:extLst>
+    <p:ext uri="{EFAFB233-063F-42B5-8137-9DF3F51BA10A}">
+      <p15:sldGuideLst xmlns:p15="http://schemas.microsoft.com/office/powerpoint/2012/main"/>
+    </p:ext>
+  </p:extLst>
 </p:presentation>
 </file>
 
@@ -239,7 +245,7 @@
           <a:p>
             <a:fld id="{7E8DA900-97C4-4375-B5B0-574AD7DA6022}" type="datetimeFigureOut">
               <a:rPr lang="ru-RU" smtClean="0"/>
-              <a:t>01.09.2018</a:t>
+              <a:t>04.09.2018</a:t>
             </a:fld>
             <a:endParaRPr lang="ru-RU"/>
           </a:p>
@@ -409,7 +415,7 @@
           <a:p>
             <a:fld id="{7E8DA900-97C4-4375-B5B0-574AD7DA6022}" type="datetimeFigureOut">
               <a:rPr lang="ru-RU" smtClean="0"/>
-              <a:t>01.09.2018</a:t>
+              <a:t>04.09.2018</a:t>
             </a:fld>
             <a:endParaRPr lang="ru-RU"/>
           </a:p>
@@ -589,7 +595,7 @@
           <a:p>
             <a:fld id="{7E8DA900-97C4-4375-B5B0-574AD7DA6022}" type="datetimeFigureOut">
               <a:rPr lang="ru-RU" smtClean="0"/>
-              <a:t>01.09.2018</a:t>
+              <a:t>04.09.2018</a:t>
             </a:fld>
             <a:endParaRPr lang="ru-RU"/>
           </a:p>
@@ -759,7 +765,7 @@
           <a:p>
             <a:fld id="{7E8DA900-97C4-4375-B5B0-574AD7DA6022}" type="datetimeFigureOut">
               <a:rPr lang="ru-RU" smtClean="0"/>
-              <a:t>01.09.2018</a:t>
+              <a:t>04.09.2018</a:t>
             </a:fld>
             <a:endParaRPr lang="ru-RU"/>
           </a:p>
@@ -1005,7 +1011,7 @@
           <a:p>
             <a:fld id="{7E8DA900-97C4-4375-B5B0-574AD7DA6022}" type="datetimeFigureOut">
               <a:rPr lang="ru-RU" smtClean="0"/>
-              <a:t>01.09.2018</a:t>
+              <a:t>04.09.2018</a:t>
             </a:fld>
             <a:endParaRPr lang="ru-RU"/>
           </a:p>
@@ -1237,7 +1243,7 @@
           <a:p>
             <a:fld id="{7E8DA900-97C4-4375-B5B0-574AD7DA6022}" type="datetimeFigureOut">
               <a:rPr lang="ru-RU" smtClean="0"/>
-              <a:t>01.09.2018</a:t>
+              <a:t>04.09.2018</a:t>
             </a:fld>
             <a:endParaRPr lang="ru-RU"/>
           </a:p>
@@ -1604,7 +1610,7 @@
           <a:p>
             <a:fld id="{7E8DA900-97C4-4375-B5B0-574AD7DA6022}" type="datetimeFigureOut">
               <a:rPr lang="ru-RU" smtClean="0"/>
-              <a:t>01.09.2018</a:t>
+              <a:t>04.09.2018</a:t>
             </a:fld>
             <a:endParaRPr lang="ru-RU"/>
           </a:p>
@@ -1722,7 +1728,7 @@
           <a:p>
             <a:fld id="{7E8DA900-97C4-4375-B5B0-574AD7DA6022}" type="datetimeFigureOut">
               <a:rPr lang="ru-RU" smtClean="0"/>
-              <a:t>01.09.2018</a:t>
+              <a:t>04.09.2018</a:t>
             </a:fld>
             <a:endParaRPr lang="ru-RU"/>
           </a:p>
@@ -1817,7 +1823,7 @@
           <a:p>
             <a:fld id="{7E8DA900-97C4-4375-B5B0-574AD7DA6022}" type="datetimeFigureOut">
               <a:rPr lang="ru-RU" smtClean="0"/>
-              <a:t>01.09.2018</a:t>
+              <a:t>04.09.2018</a:t>
             </a:fld>
             <a:endParaRPr lang="ru-RU"/>
           </a:p>
@@ -2094,7 +2100,7 @@
           <a:p>
             <a:fld id="{7E8DA900-97C4-4375-B5B0-574AD7DA6022}" type="datetimeFigureOut">
               <a:rPr lang="ru-RU" smtClean="0"/>
-              <a:t>01.09.2018</a:t>
+              <a:t>04.09.2018</a:t>
             </a:fld>
             <a:endParaRPr lang="ru-RU"/>
           </a:p>
@@ -2347,7 +2353,7 @@
           <a:p>
             <a:fld id="{7E8DA900-97C4-4375-B5B0-574AD7DA6022}" type="datetimeFigureOut">
               <a:rPr lang="ru-RU" smtClean="0"/>
-              <a:t>01.09.2018</a:t>
+              <a:t>04.09.2018</a:t>
             </a:fld>
             <a:endParaRPr lang="ru-RU"/>
           </a:p>
@@ -2560,7 +2566,7 @@
           <a:p>
             <a:fld id="{7E8DA900-97C4-4375-B5B0-574AD7DA6022}" type="datetimeFigureOut">
               <a:rPr lang="ru-RU" smtClean="0"/>
-              <a:t>01.09.2018</a:t>
+              <a:t>04.09.2018</a:t>
             </a:fld>
             <a:endParaRPr lang="ru-RU"/>
           </a:p>
@@ -3543,7 +3549,7 @@
         </p:nvSpPr>
         <p:spPr>
           <a:xfrm>
-            <a:off x="627797" y="627797"/>
+            <a:off x="668740" y="1078173"/>
             <a:ext cx="2620370" cy="4893647"/>
           </a:xfrm>
           <a:prstGeom prst="rect">
@@ -3700,6 +3706,296 @@
     <p:extLst>
       <p:ext uri="{BB962C8B-B14F-4D97-AF65-F5344CB8AC3E}">
         <p14:creationId xmlns:p14="http://schemas.microsoft.com/office/powerpoint/2010/main" val="1274995426"/>
+      </p:ext>
+    </p:extLst>
+  </p:cSld>
+  <p:clrMapOvr>
+    <a:masterClrMapping/>
+  </p:clrMapOvr>
+</p:sld>
+</file>
+
+<file path=ppt/slides/slide3.xml><?xml version="1.0" encoding="utf-8"?>
+<p:sld xmlns:a="http://schemas.openxmlformats.org/drawingml/2006/main" xmlns:r="http://schemas.openxmlformats.org/officeDocument/2006/relationships" xmlns:p="http://schemas.openxmlformats.org/presentationml/2006/main">
+  <p:cSld>
+    <p:spTree>
+      <p:nvGrpSpPr>
+        <p:cNvPr id="1" name=""/>
+        <p:cNvGrpSpPr/>
+        <p:nvPr/>
+      </p:nvGrpSpPr>
+      <p:grpSpPr>
+        <a:xfrm>
+          <a:off x="0" y="0"/>
+          <a:ext cx="0" cy="0"/>
+          <a:chOff x="0" y="0"/>
+          <a:chExt cx="0" cy="0"/>
+        </a:xfrm>
+      </p:grpSpPr>
+      <p:sp>
+        <p:nvSpPr>
+          <p:cNvPr id="3" name="Объект 2"/>
+          <p:cNvSpPr>
+            <a:spLocks noGrp="1"/>
+          </p:cNvSpPr>
+          <p:nvPr>
+            <p:ph idx="1"/>
+          </p:nvPr>
+        </p:nvSpPr>
+        <p:spPr>
+          <a:xfrm>
+            <a:off x="524301" y="245660"/>
+            <a:ext cx="10515600" cy="6428095"/>
+          </a:xfrm>
+        </p:spPr>
+        <p:txBody>
+          <a:bodyPr>
+            <a:noAutofit/>
+          </a:bodyPr>
+          <a:lstStyle/>
+          <a:p>
+            <a:pPr marL="0" indent="0">
+              <a:buNone/>
+            </a:pPr>
+            <a:r>
+              <a:rPr lang="uk-UA" sz="3200" b="1" dirty="0" smtClean="0">
+                <a:latin typeface="Times New Roman" panose="02020603050405020304" pitchFamily="18" charset="0"/>
+                <a:cs typeface="Times New Roman" panose="02020603050405020304" pitchFamily="18" charset="0"/>
+              </a:rPr>
+              <a:t>Виправити помилки:</a:t>
+            </a:r>
+          </a:p>
+          <a:p>
+            <a:pPr marL="0" indent="0">
+              <a:buNone/>
+            </a:pPr>
+            <a:r>
+              <a:rPr lang="en-US" sz="3200" dirty="0" smtClean="0">
+                <a:latin typeface="Times New Roman" panose="02020603050405020304" pitchFamily="18" charset="0"/>
+                <a:cs typeface="Times New Roman" panose="02020603050405020304" pitchFamily="18" charset="0"/>
+              </a:rPr>
+              <a:t>print(Hello guys!)</a:t>
+            </a:r>
+          </a:p>
+          <a:p>
+            <a:pPr marL="0" indent="0">
+              <a:buNone/>
+            </a:pPr>
+            <a:r>
+              <a:rPr lang="en-US" sz="3200" dirty="0" smtClean="0">
+                <a:latin typeface="Times New Roman" panose="02020603050405020304" pitchFamily="18" charset="0"/>
+                <a:cs typeface="Times New Roman" panose="02020603050405020304" pitchFamily="18" charset="0"/>
+              </a:rPr>
+              <a:t>type(“5.0”) == float 	#</a:t>
+            </a:r>
+            <a:r>
+              <a:rPr lang="uk-UA" sz="3200" dirty="0" smtClean="0">
+                <a:latin typeface="Times New Roman" panose="02020603050405020304" pitchFamily="18" charset="0"/>
+                <a:cs typeface="Times New Roman" panose="02020603050405020304" pitchFamily="18" charset="0"/>
+              </a:rPr>
+              <a:t>тип даних для </a:t>
+            </a:r>
+            <a:r>
+              <a:rPr lang="en-US" sz="3200" dirty="0">
+                <a:latin typeface="Times New Roman" panose="02020603050405020304" pitchFamily="18" charset="0"/>
+                <a:cs typeface="Times New Roman" panose="02020603050405020304" pitchFamily="18" charset="0"/>
+              </a:rPr>
+              <a:t>“5.0</a:t>
+            </a:r>
+            <a:r>
+              <a:rPr lang="en-US" sz="3200" dirty="0" smtClean="0">
+                <a:latin typeface="Times New Roman" panose="02020603050405020304" pitchFamily="18" charset="0"/>
+                <a:cs typeface="Times New Roman" panose="02020603050405020304" pitchFamily="18" charset="0"/>
+              </a:rPr>
+              <a:t>”</a:t>
+            </a:r>
+            <a:r>
+              <a:rPr lang="uk-UA" sz="3200" dirty="0" smtClean="0">
+                <a:latin typeface="Times New Roman" panose="02020603050405020304" pitchFamily="18" charset="0"/>
+                <a:cs typeface="Times New Roman" panose="02020603050405020304" pitchFamily="18" charset="0"/>
+              </a:rPr>
+              <a:t> </a:t>
+            </a:r>
+            <a:r>
+              <a:rPr lang="en-US" sz="3200" dirty="0" smtClean="0">
+                <a:latin typeface="Times New Roman" panose="02020603050405020304" pitchFamily="18" charset="0"/>
+                <a:cs typeface="Times New Roman" panose="02020603050405020304" pitchFamily="18" charset="0"/>
+              </a:rPr>
+              <a:t>float?</a:t>
+            </a:r>
+          </a:p>
+          <a:p>
+            <a:pPr marL="0" indent="0">
+              <a:buNone/>
+            </a:pPr>
+            <a:r>
+              <a:rPr lang="en-US" sz="3200" dirty="0" smtClean="0">
+                <a:latin typeface="Times New Roman" panose="02020603050405020304" pitchFamily="18" charset="0"/>
+                <a:cs typeface="Times New Roman" panose="02020603050405020304" pitchFamily="18" charset="0"/>
+              </a:rPr>
+              <a:t>get random	#</a:t>
+            </a:r>
+            <a:r>
+              <a:rPr lang="uk-UA" sz="3200" dirty="0" smtClean="0">
+                <a:latin typeface="Times New Roman" panose="02020603050405020304" pitchFamily="18" charset="0"/>
+                <a:cs typeface="Times New Roman" panose="02020603050405020304" pitchFamily="18" charset="0"/>
+              </a:rPr>
+              <a:t>команда для імпорту бібліотеки </a:t>
+            </a:r>
+            <a:r>
+              <a:rPr lang="en-US" sz="3200" dirty="0">
+                <a:latin typeface="Times New Roman" panose="02020603050405020304" pitchFamily="18" charset="0"/>
+                <a:cs typeface="Times New Roman" panose="02020603050405020304" pitchFamily="18" charset="0"/>
+              </a:rPr>
+              <a:t>random</a:t>
+            </a:r>
+            <a:endParaRPr lang="en-US" sz="3200" dirty="0" smtClean="0">
+              <a:latin typeface="Times New Roman" panose="02020603050405020304" pitchFamily="18" charset="0"/>
+              <a:cs typeface="Times New Roman" panose="02020603050405020304" pitchFamily="18" charset="0"/>
+            </a:endParaRPr>
+          </a:p>
+          <a:p>
+            <a:pPr marL="0" indent="0">
+              <a:buNone/>
+            </a:pPr>
+            <a:r>
+              <a:rPr lang="uk-UA" sz="3200" b="1" dirty="0" smtClean="0">
+                <a:latin typeface="Times New Roman" panose="02020603050405020304" pitchFamily="18" charset="0"/>
+                <a:cs typeface="Times New Roman" panose="02020603050405020304" pitchFamily="18" charset="0"/>
+              </a:rPr>
+              <a:t>Який результат виконання операці</a:t>
+            </a:r>
+            <a:r>
+              <a:rPr lang="uk-UA" sz="3200" b="1" dirty="0">
+                <a:latin typeface="Times New Roman" panose="02020603050405020304" pitchFamily="18" charset="0"/>
+                <a:cs typeface="Times New Roman" panose="02020603050405020304" pitchFamily="18" charset="0"/>
+              </a:rPr>
+              <a:t>й</a:t>
+            </a:r>
+            <a:r>
+              <a:rPr lang="uk-UA" sz="3200" b="1" dirty="0" smtClean="0">
+                <a:latin typeface="Times New Roman" panose="02020603050405020304" pitchFamily="18" charset="0"/>
+                <a:cs typeface="Times New Roman" panose="02020603050405020304" pitchFamily="18" charset="0"/>
+              </a:rPr>
+              <a:t>:</a:t>
+            </a:r>
+          </a:p>
+          <a:p>
+            <a:pPr marL="514350" indent="-514350">
+              <a:buAutoNum type="arabicPeriod"/>
+            </a:pPr>
+            <a:r>
+              <a:rPr lang="ru-RU" sz="3200" dirty="0" smtClean="0">
+                <a:latin typeface="Times New Roman" panose="02020603050405020304" pitchFamily="18" charset="0"/>
+                <a:cs typeface="Times New Roman" panose="02020603050405020304" pitchFamily="18" charset="0"/>
+              </a:rPr>
+              <a:t>25 </a:t>
+            </a:r>
+            <a:r>
+              <a:rPr lang="ru-RU" sz="3200" dirty="0">
+                <a:latin typeface="Times New Roman" panose="02020603050405020304" pitchFamily="18" charset="0"/>
+                <a:cs typeface="Times New Roman" panose="02020603050405020304" pitchFamily="18" charset="0"/>
+              </a:rPr>
+              <a:t>* 68 + 13 / </a:t>
+            </a:r>
+            <a:r>
+              <a:rPr lang="ru-RU" sz="3200" dirty="0" smtClean="0">
+                <a:latin typeface="Times New Roman" panose="02020603050405020304" pitchFamily="18" charset="0"/>
+                <a:cs typeface="Times New Roman" panose="02020603050405020304" pitchFamily="18" charset="0"/>
+              </a:rPr>
+              <a:t>28 = </a:t>
+            </a:r>
+            <a:endParaRPr lang="en-US" sz="3200" dirty="0" smtClean="0">
+              <a:latin typeface="Times New Roman" panose="02020603050405020304" pitchFamily="18" charset="0"/>
+              <a:cs typeface="Times New Roman" panose="02020603050405020304" pitchFamily="18" charset="0"/>
+            </a:endParaRPr>
+          </a:p>
+          <a:p>
+            <a:pPr marL="514350" indent="-514350">
+              <a:buAutoNum type="arabicPeriod"/>
+            </a:pPr>
+            <a:r>
+              <a:rPr lang="en-US" sz="3200" dirty="0" smtClean="0">
+                <a:latin typeface="Times New Roman" panose="02020603050405020304" pitchFamily="18" charset="0"/>
+                <a:cs typeface="Times New Roman" panose="02020603050405020304" pitchFamily="18" charset="0"/>
+              </a:rPr>
+              <a:t>5 + “</a:t>
+            </a:r>
+            <a:r>
+              <a:rPr lang="en-US" sz="3200" dirty="0" err="1" smtClean="0">
+                <a:latin typeface="Times New Roman" panose="02020603050405020304" pitchFamily="18" charset="0"/>
+                <a:cs typeface="Times New Roman" panose="02020603050405020304" pitchFamily="18" charset="0"/>
+              </a:rPr>
+              <a:t>ive</a:t>
+            </a:r>
+            <a:r>
+              <a:rPr lang="en-US" sz="3200" dirty="0" smtClean="0">
+                <a:latin typeface="Times New Roman" panose="02020603050405020304" pitchFamily="18" charset="0"/>
+                <a:cs typeface="Times New Roman" panose="02020603050405020304" pitchFamily="18" charset="0"/>
+              </a:rPr>
+              <a:t>” = </a:t>
+            </a:r>
+          </a:p>
+          <a:p>
+            <a:pPr marL="514350" indent="-514350">
+              <a:buAutoNum type="arabicPeriod"/>
+            </a:pPr>
+            <a:r>
+              <a:rPr lang="en-US" sz="3200" dirty="0" smtClean="0">
+                <a:latin typeface="Times New Roman" panose="02020603050405020304" pitchFamily="18" charset="0"/>
+                <a:cs typeface="Times New Roman" panose="02020603050405020304" pitchFamily="18" charset="0"/>
+              </a:rPr>
+              <a:t>5 * “I” =</a:t>
+            </a:r>
+          </a:p>
+          <a:p>
+            <a:pPr marL="514350" indent="-514350">
+              <a:buAutoNum type="arabicPeriod"/>
+            </a:pPr>
+            <a:r>
+              <a:rPr lang="en-US" sz="3200" dirty="0" smtClean="0">
+                <a:latin typeface="Times New Roman" panose="02020603050405020304" pitchFamily="18" charset="0"/>
+                <a:cs typeface="Times New Roman" panose="02020603050405020304" pitchFamily="18" charset="0"/>
+              </a:rPr>
+              <a:t>5 * float(“5”)</a:t>
+            </a:r>
+          </a:p>
+          <a:p>
+            <a:pPr marL="514350" indent="-514350">
+              <a:buAutoNum type="arabicPeriod"/>
+            </a:pPr>
+            <a:r>
+              <a:rPr lang="en-US" sz="3200" dirty="0" smtClean="0">
+                <a:latin typeface="Times New Roman" panose="02020603050405020304" pitchFamily="18" charset="0"/>
+                <a:cs typeface="Times New Roman" panose="02020603050405020304" pitchFamily="18" charset="0"/>
+              </a:rPr>
+              <a:t>7 % 2</a:t>
+            </a:r>
+          </a:p>
+          <a:p>
+            <a:pPr marL="514350" indent="-514350">
+              <a:buAutoNum type="arabicPeriod"/>
+            </a:pPr>
+            <a:endParaRPr lang="uk-UA" sz="3200" dirty="0" smtClean="0">
+              <a:latin typeface="Times New Roman" panose="02020603050405020304" pitchFamily="18" charset="0"/>
+              <a:cs typeface="Times New Roman" panose="02020603050405020304" pitchFamily="18" charset="0"/>
+            </a:endParaRPr>
+          </a:p>
+          <a:p>
+            <a:pPr marL="0" indent="0">
+              <a:buNone/>
+            </a:pPr>
+            <a:endParaRPr lang="ru-RU" sz="3200" dirty="0">
+              <a:latin typeface="Times New Roman" panose="02020603050405020304" pitchFamily="18" charset="0"/>
+              <a:cs typeface="Times New Roman" panose="02020603050405020304" pitchFamily="18" charset="0"/>
+            </a:endParaRPr>
+          </a:p>
+        </p:txBody>
+      </p:sp>
+    </p:spTree>
+    <p:extLst>
+      <p:ext uri="{BB962C8B-B14F-4D97-AF65-F5344CB8AC3E}">
+        <p14:creationId xmlns:p14="http://schemas.microsoft.com/office/powerpoint/2010/main" val="2796546150"/>
       </p:ext>
     </p:extLst>
   </p:cSld>

</xml_diff>